<commit_message>
Added powerpoint for part 1
</commit_message>
<xml_diff>
--- a/Project Specs/Matt N part 1 design.pptx
+++ b/Project Specs/Matt N part 1 design.pptx
@@ -6,6 +6,14 @@
   </p:sldMasterIdLst>
   <p:sldIdLst>
     <p:sldId id="256" r:id="rId2"/>
+    <p:sldId id="264" r:id="rId3"/>
+    <p:sldId id="257" r:id="rId4"/>
+    <p:sldId id="258" r:id="rId5"/>
+    <p:sldId id="265" r:id="rId6"/>
+    <p:sldId id="260" r:id="rId7"/>
+    <p:sldId id="261" r:id="rId8"/>
+    <p:sldId id="262" r:id="rId9"/>
+    <p:sldId id="263" r:id="rId10"/>
   </p:sldIdLst>
   <p:sldSz cx="9144000" cy="6858000" type="screen4x3"/>
   <p:notesSz cx="6858000" cy="9144000"/>
@@ -219,7 +227,7 @@
             <a:fld id="{1D8BD707-D9CF-40AE-B4C6-C98DA3205C09}" type="datetimeFigureOut">
               <a:rPr lang="en-US" smtClean="0"/>
               <a:pPr/>
-              <a:t>10/27/2014</a:t>
+              <a:t>10/28/2014</a:t>
             </a:fld>
             <a:endParaRPr lang="en-US"/>
           </a:p>
@@ -447,7 +455,7 @@
             <a:fld id="{1D8BD707-D9CF-40AE-B4C6-C98DA3205C09}" type="datetimeFigureOut">
               <a:rPr lang="en-US" smtClean="0"/>
               <a:pPr/>
-              <a:t>10/27/2014</a:t>
+              <a:t>10/28/2014</a:t>
             </a:fld>
             <a:endParaRPr lang="en-US"/>
           </a:p>
@@ -624,7 +632,7 @@
             <a:fld id="{1D8BD707-D9CF-40AE-B4C6-C98DA3205C09}" type="datetimeFigureOut">
               <a:rPr lang="en-US" smtClean="0"/>
               <a:pPr/>
-              <a:t>10/27/2014</a:t>
+              <a:t>10/28/2014</a:t>
             </a:fld>
             <a:endParaRPr lang="en-US"/>
           </a:p>
@@ -791,7 +799,7 @@
             <a:fld id="{1D8BD707-D9CF-40AE-B4C6-C98DA3205C09}" type="datetimeFigureOut">
               <a:rPr lang="en-US" smtClean="0"/>
               <a:pPr/>
-              <a:t>10/27/2014</a:t>
+              <a:t>10/28/2014</a:t>
             </a:fld>
             <a:endParaRPr lang="en-US"/>
           </a:p>
@@ -1037,7 +1045,7 @@
             <a:fld id="{1D8BD707-D9CF-40AE-B4C6-C98DA3205C09}" type="datetimeFigureOut">
               <a:rPr lang="en-US" smtClean="0"/>
               <a:pPr/>
-              <a:t>10/27/2014</a:t>
+              <a:t>10/28/2014</a:t>
             </a:fld>
             <a:endParaRPr lang="en-US"/>
           </a:p>
@@ -1303,7 +1311,7 @@
             <a:fld id="{1D8BD707-D9CF-40AE-B4C6-C98DA3205C09}" type="datetimeFigureOut">
               <a:rPr lang="en-US" smtClean="0"/>
               <a:pPr/>
-              <a:t>10/27/2014</a:t>
+              <a:t>10/28/2014</a:t>
             </a:fld>
             <a:endParaRPr lang="en-US"/>
           </a:p>
@@ -1679,7 +1687,7 @@
             <a:fld id="{1D8BD707-D9CF-40AE-B4C6-C98DA3205C09}" type="datetimeFigureOut">
               <a:rPr lang="en-US" smtClean="0"/>
               <a:pPr/>
-              <a:t>10/27/2014</a:t>
+              <a:t>10/28/2014</a:t>
             </a:fld>
             <a:endParaRPr lang="en-US"/>
           </a:p>
@@ -1794,7 +1802,7 @@
             <a:fld id="{1D8BD707-D9CF-40AE-B4C6-C98DA3205C09}" type="datetimeFigureOut">
               <a:rPr lang="en-US" smtClean="0"/>
               <a:pPr/>
-              <a:t>10/27/2014</a:t>
+              <a:t>10/28/2014</a:t>
             </a:fld>
             <a:endParaRPr lang="en-US"/>
           </a:p>
@@ -1886,7 +1894,7 @@
             <a:fld id="{1D8BD707-D9CF-40AE-B4C6-C98DA3205C09}" type="datetimeFigureOut">
               <a:rPr lang="en-US" smtClean="0"/>
               <a:pPr/>
-              <a:t>10/27/2014</a:t>
+              <a:t>10/28/2014</a:t>
             </a:fld>
             <a:endParaRPr lang="en-US"/>
           </a:p>
@@ -2146,7 +2154,7 @@
             <a:fld id="{1D8BD707-D9CF-40AE-B4C6-C98DA3205C09}" type="datetimeFigureOut">
               <a:rPr lang="en-US" smtClean="0"/>
               <a:pPr/>
-              <a:t>10/27/2014</a:t>
+              <a:t>10/28/2014</a:t>
             </a:fld>
             <a:endParaRPr lang="en-US"/>
           </a:p>
@@ -2412,7 +2420,7 @@
             <a:fld id="{1D8BD707-D9CF-40AE-B4C6-C98DA3205C09}" type="datetimeFigureOut">
               <a:rPr lang="en-US" smtClean="0"/>
               <a:pPr/>
-              <a:t>10/27/2014</a:t>
+              <a:t>10/28/2014</a:t>
             </a:fld>
             <a:endParaRPr lang="en-US"/>
           </a:p>
@@ -2631,7 +2639,7 @@
             <a:fld id="{1D8BD707-D9CF-40AE-B4C6-C98DA3205C09}" type="datetimeFigureOut">
               <a:rPr lang="en-US" smtClean="0"/>
               <a:pPr/>
-              <a:t>10/27/2014</a:t>
+              <a:t>10/28/2014</a:t>
             </a:fld>
             <a:endParaRPr lang="en-US"/>
           </a:p>
@@ -3139,6 +3147,1159 @@
   <p:clrMapOvr>
     <a:masterClrMapping/>
   </p:clrMapOvr>
+  <p:timing>
+    <p:tnLst>
+      <p:par>
+        <p:cTn id="1" dur="indefinite" restart="never" nodeType="tmRoot"/>
+      </p:par>
+    </p:tnLst>
+  </p:timing>
+</p:sld>
+</file>
+
+<file path=ppt/slides/slide2.xml><?xml version="1.0" encoding="utf-8"?>
+<p:sld xmlns:a="http://schemas.openxmlformats.org/drawingml/2006/main" xmlns:r="http://schemas.openxmlformats.org/officeDocument/2006/relationships" xmlns:p="http://schemas.openxmlformats.org/presentationml/2006/main">
+  <p:cSld>
+    <p:spTree>
+      <p:nvGrpSpPr>
+        <p:cNvPr id="1" name=""/>
+        <p:cNvGrpSpPr/>
+        <p:nvPr/>
+      </p:nvGrpSpPr>
+      <p:grpSpPr>
+        <a:xfrm>
+          <a:off x="0" y="0"/>
+          <a:ext cx="0" cy="0"/>
+          <a:chOff x="0" y="0"/>
+          <a:chExt cx="0" cy="0"/>
+        </a:xfrm>
+      </p:grpSpPr>
+      <p:sp>
+        <p:nvSpPr>
+          <p:cNvPr id="2" name="Title 1"/>
+          <p:cNvSpPr>
+            <a:spLocks noGrp="1"/>
+          </p:cNvSpPr>
+          <p:nvPr>
+            <p:ph type="title"/>
+          </p:nvPr>
+        </p:nvSpPr>
+        <p:spPr/>
+        <p:txBody>
+          <a:bodyPr/>
+          <a:lstStyle/>
+          <a:p>
+            <a:r>
+              <a:rPr lang="en-US" dirty="0" smtClean="0"/>
+              <a:t>Application Vision and Idea</a:t>
+            </a:r>
+            <a:endParaRPr lang="en-US" dirty="0"/>
+          </a:p>
+        </p:txBody>
+      </p:sp>
+      <p:sp>
+        <p:nvSpPr>
+          <p:cNvPr id="3" name="Content Placeholder 2"/>
+          <p:cNvSpPr>
+            <a:spLocks noGrp="1"/>
+          </p:cNvSpPr>
+          <p:nvPr>
+            <p:ph idx="1"/>
+          </p:nvPr>
+        </p:nvSpPr>
+        <p:spPr>
+          <a:xfrm>
+            <a:off x="457200" y="4724400"/>
+            <a:ext cx="8229600" cy="1584960"/>
+          </a:xfrm>
+        </p:spPr>
+        <p:txBody>
+          <a:bodyPr/>
+          <a:lstStyle/>
+          <a:p>
+            <a:r>
+              <a:rPr lang="en-US" dirty="0" smtClean="0"/>
+              <a:t>Strategic turn based mobile unit combat game</a:t>
+            </a:r>
+          </a:p>
+          <a:p>
+            <a:endParaRPr lang="en-US" dirty="0"/>
+          </a:p>
+        </p:txBody>
+      </p:sp>
+      <p:pic>
+        <p:nvPicPr>
+          <p:cNvPr id="1027" name="Picture 3" descr="C:\Users\Matt\Desktop\Computer Science\Comp595\android_combat_game\Project Specs\Screenshot_2014-10-28-22-23-04.png"/>
+          <p:cNvPicPr>
+            <a:picLocks noChangeAspect="1" noChangeArrowheads="1"/>
+          </p:cNvPicPr>
+          <p:nvPr/>
+        </p:nvPicPr>
+        <p:blipFill>
+          <a:blip r:embed="rId2" cstate="print">
+            <a:extLst>
+              <a:ext uri="{28A0092B-C50C-407E-A947-70E740481C1C}">
+                <a14:useLocalDpi xmlns:a14="http://schemas.microsoft.com/office/drawing/2010/main" val="0"/>
+              </a:ext>
+            </a:extLst>
+          </a:blip>
+          <a:srcRect/>
+          <a:stretch>
+            <a:fillRect/>
+          </a:stretch>
+        </p:blipFill>
+        <p:spPr bwMode="auto">
+          <a:xfrm>
+            <a:off x="4669367" y="1600200"/>
+            <a:ext cx="4064000" cy="2286000"/>
+          </a:xfrm>
+          <a:prstGeom prst="rect">
+            <a:avLst/>
+          </a:prstGeom>
+          <a:noFill/>
+          <a:extLst>
+            <a:ext uri="{909E8E84-426E-40DD-AFC4-6F175D3DCCD1}">
+              <a14:hiddenFill xmlns:a14="http://schemas.microsoft.com/office/drawing/2010/main">
+                <a:solidFill>
+                  <a:srgbClr val="FFFFFF"/>
+                </a:solidFill>
+              </a14:hiddenFill>
+            </a:ext>
+          </a:extLst>
+        </p:spPr>
+      </p:pic>
+      <p:pic>
+        <p:nvPicPr>
+          <p:cNvPr id="1028" name="Picture 4" descr="C:\Users\Matt\Desktop\Computer Science\Comp595\android_combat_game\Project Specs\inspiration.jpg"/>
+          <p:cNvPicPr>
+            <a:picLocks noChangeAspect="1" noChangeArrowheads="1"/>
+          </p:cNvPicPr>
+          <p:nvPr/>
+        </p:nvPicPr>
+        <p:blipFill>
+          <a:blip r:embed="rId3" cstate="print">
+            <a:extLst>
+              <a:ext uri="{28A0092B-C50C-407E-A947-70E740481C1C}">
+                <a14:useLocalDpi xmlns:a14="http://schemas.microsoft.com/office/drawing/2010/main" val="0"/>
+              </a:ext>
+            </a:extLst>
+          </a:blip>
+          <a:srcRect/>
+          <a:stretch>
+            <a:fillRect/>
+          </a:stretch>
+        </p:blipFill>
+        <p:spPr bwMode="auto">
+          <a:xfrm>
+            <a:off x="307415" y="1632642"/>
+            <a:ext cx="4035985" cy="2270241"/>
+          </a:xfrm>
+          <a:prstGeom prst="rect">
+            <a:avLst/>
+          </a:prstGeom>
+          <a:noFill/>
+          <a:extLst>
+            <a:ext uri="{909E8E84-426E-40DD-AFC4-6F175D3DCCD1}">
+              <a14:hiddenFill xmlns:a14="http://schemas.microsoft.com/office/drawing/2010/main">
+                <a:solidFill>
+                  <a:srgbClr val="FFFFFF"/>
+                </a:solidFill>
+              </a14:hiddenFill>
+            </a:ext>
+          </a:extLst>
+        </p:spPr>
+      </p:pic>
+    </p:spTree>
+    <p:extLst>
+      <p:ext uri="{BB962C8B-B14F-4D97-AF65-F5344CB8AC3E}">
+        <p14:creationId xmlns:p14="http://schemas.microsoft.com/office/powerpoint/2010/main" val="740833071"/>
+      </p:ext>
+    </p:extLst>
+  </p:cSld>
+  <p:clrMapOvr>
+    <a:masterClrMapping/>
+  </p:clrMapOvr>
+  <p:timing>
+    <p:tnLst>
+      <p:par>
+        <p:cTn id="1" dur="indefinite" restart="never" nodeType="tmRoot"/>
+      </p:par>
+    </p:tnLst>
+  </p:timing>
+</p:sld>
+</file>
+
+<file path=ppt/slides/slide3.xml><?xml version="1.0" encoding="utf-8"?>
+<p:sld xmlns:a="http://schemas.openxmlformats.org/drawingml/2006/main" xmlns:r="http://schemas.openxmlformats.org/officeDocument/2006/relationships" xmlns:p="http://schemas.openxmlformats.org/presentationml/2006/main">
+  <p:cSld>
+    <p:spTree>
+      <p:nvGrpSpPr>
+        <p:cNvPr id="1" name=""/>
+        <p:cNvGrpSpPr/>
+        <p:nvPr/>
+      </p:nvGrpSpPr>
+      <p:grpSpPr>
+        <a:xfrm>
+          <a:off x="0" y="0"/>
+          <a:ext cx="0" cy="0"/>
+          <a:chOff x="0" y="0"/>
+          <a:chExt cx="0" cy="0"/>
+        </a:xfrm>
+      </p:grpSpPr>
+      <p:sp>
+        <p:nvSpPr>
+          <p:cNvPr id="2" name="Title 1"/>
+          <p:cNvSpPr>
+            <a:spLocks noGrp="1"/>
+          </p:cNvSpPr>
+          <p:nvPr>
+            <p:ph type="title"/>
+          </p:nvPr>
+        </p:nvSpPr>
+        <p:spPr/>
+        <p:txBody>
+          <a:bodyPr/>
+          <a:lstStyle/>
+          <a:p>
+            <a:r>
+              <a:rPr lang="en-US" dirty="0" smtClean="0"/>
+              <a:t>Project Backlog (Summary)</a:t>
+            </a:r>
+            <a:endParaRPr lang="en-US" dirty="0"/>
+          </a:p>
+        </p:txBody>
+      </p:sp>
+      <p:sp>
+        <p:nvSpPr>
+          <p:cNvPr id="3" name="Content Placeholder 2"/>
+          <p:cNvSpPr>
+            <a:spLocks noGrp="1"/>
+          </p:cNvSpPr>
+          <p:nvPr>
+            <p:ph idx="1"/>
+          </p:nvPr>
+        </p:nvSpPr>
+        <p:spPr/>
+        <p:txBody>
+          <a:bodyPr>
+            <a:normAutofit/>
+          </a:bodyPr>
+          <a:lstStyle/>
+          <a:p>
+            <a:r>
+              <a:rPr lang="en-US" sz="2400" dirty="0" smtClean="0"/>
+              <a:t>Render main menu screen and map </a:t>
+            </a:r>
+          </a:p>
+          <a:p>
+            <a:r>
+              <a:rPr lang="en-US" sz="2400" dirty="0" smtClean="0"/>
+              <a:t>Design and implement player objects and sub objects</a:t>
+            </a:r>
+          </a:p>
+          <a:p>
+            <a:r>
+              <a:rPr lang="en-US" sz="2400" dirty="0" smtClean="0"/>
+              <a:t>Implement player</a:t>
+            </a:r>
+            <a:r>
+              <a:rPr lang="en-US" sz="2400" dirty="0"/>
+              <a:t>’s</a:t>
+            </a:r>
+            <a:r>
+              <a:rPr lang="en-US" sz="2400" dirty="0" smtClean="0"/>
+              <a:t> set units phase</a:t>
+            </a:r>
+          </a:p>
+          <a:p>
+            <a:r>
+              <a:rPr lang="en-US" sz="2400" dirty="0" smtClean="0"/>
+              <a:t>Implement player</a:t>
+            </a:r>
+            <a:r>
+              <a:rPr lang="en-US" sz="2400" dirty="0"/>
+              <a:t>’s</a:t>
+            </a:r>
+            <a:r>
+              <a:rPr lang="en-US" sz="2400" dirty="0" smtClean="0"/>
+              <a:t> unit movement and vision</a:t>
+            </a:r>
+          </a:p>
+          <a:p>
+            <a:r>
+              <a:rPr lang="en-US" sz="2400" dirty="0" smtClean="0"/>
+              <a:t>Implement player’s unit attack</a:t>
+            </a:r>
+          </a:p>
+          <a:p>
+            <a:r>
+              <a:rPr lang="en-US" sz="2400" dirty="0" smtClean="0"/>
+              <a:t>Implement winning game features</a:t>
+            </a:r>
+          </a:p>
+          <a:p>
+            <a:r>
+              <a:rPr lang="en-US" sz="2400" dirty="0" smtClean="0"/>
+              <a:t>Implement player’s base object</a:t>
+            </a:r>
+            <a:endParaRPr lang="en-US" sz="2400" dirty="0"/>
+          </a:p>
+        </p:txBody>
+      </p:sp>
+      <p:pic>
+        <p:nvPicPr>
+          <p:cNvPr id="4" name="Content Placeholder 3"/>
+          <p:cNvPicPr>
+            <a:picLocks noChangeAspect="1"/>
+          </p:cNvPicPr>
+          <p:nvPr/>
+        </p:nvPicPr>
+        <p:blipFill>
+          <a:blip r:embed="rId2">
+            <a:extLst>
+              <a:ext uri="{28A0092B-C50C-407E-A947-70E740481C1C}">
+                <a14:useLocalDpi xmlns:a14="http://schemas.microsoft.com/office/drawing/2010/main" val="0"/>
+              </a:ext>
+            </a:extLst>
+          </a:blip>
+          <a:stretch>
+            <a:fillRect/>
+          </a:stretch>
+        </p:blipFill>
+        <p:spPr>
+          <a:xfrm>
+            <a:off x="1981200" y="4800600"/>
+            <a:ext cx="5029200" cy="1792586"/>
+          </a:xfrm>
+          <a:prstGeom prst="rect">
+            <a:avLst/>
+          </a:prstGeom>
+        </p:spPr>
+      </p:pic>
+    </p:spTree>
+    <p:extLst>
+      <p:ext uri="{BB962C8B-B14F-4D97-AF65-F5344CB8AC3E}">
+        <p14:creationId xmlns:p14="http://schemas.microsoft.com/office/powerpoint/2010/main" val="4293038697"/>
+      </p:ext>
+    </p:extLst>
+  </p:cSld>
+  <p:clrMapOvr>
+    <a:masterClrMapping/>
+  </p:clrMapOvr>
+  <p:timing>
+    <p:tnLst>
+      <p:par>
+        <p:cTn id="1" dur="indefinite" restart="never" nodeType="tmRoot"/>
+      </p:par>
+    </p:tnLst>
+  </p:timing>
+</p:sld>
+</file>
+
+<file path=ppt/slides/slide4.xml><?xml version="1.0" encoding="utf-8"?>
+<p:sld xmlns:a="http://schemas.openxmlformats.org/drawingml/2006/main" xmlns:r="http://schemas.openxmlformats.org/officeDocument/2006/relationships" xmlns:p="http://schemas.openxmlformats.org/presentationml/2006/main">
+  <p:cSld>
+    <p:spTree>
+      <p:nvGrpSpPr>
+        <p:cNvPr id="1" name=""/>
+        <p:cNvGrpSpPr/>
+        <p:nvPr/>
+      </p:nvGrpSpPr>
+      <p:grpSpPr>
+        <a:xfrm>
+          <a:off x="0" y="0"/>
+          <a:ext cx="0" cy="0"/>
+          <a:chOff x="0" y="0"/>
+          <a:chExt cx="0" cy="0"/>
+        </a:xfrm>
+      </p:grpSpPr>
+      <p:sp>
+        <p:nvSpPr>
+          <p:cNvPr id="2" name="Title 1"/>
+          <p:cNvSpPr>
+            <a:spLocks noGrp="1"/>
+          </p:cNvSpPr>
+          <p:nvPr>
+            <p:ph type="title"/>
+          </p:nvPr>
+        </p:nvSpPr>
+        <p:spPr/>
+        <p:txBody>
+          <a:bodyPr/>
+          <a:lstStyle/>
+          <a:p>
+            <a:r>
+              <a:rPr lang="en-US" dirty="0" smtClean="0"/>
+              <a:t>SCRUM Methodology </a:t>
+            </a:r>
+            <a:endParaRPr lang="en-US" dirty="0"/>
+          </a:p>
+        </p:txBody>
+      </p:sp>
+      <p:sp>
+        <p:nvSpPr>
+          <p:cNvPr id="3" name="Content Placeholder 2"/>
+          <p:cNvSpPr>
+            <a:spLocks noGrp="1"/>
+          </p:cNvSpPr>
+          <p:nvPr>
+            <p:ph idx="1"/>
+          </p:nvPr>
+        </p:nvSpPr>
+        <p:spPr/>
+        <p:txBody>
+          <a:bodyPr>
+            <a:normAutofit/>
+          </a:bodyPr>
+          <a:lstStyle/>
+          <a:p>
+            <a:r>
+              <a:rPr lang="en-US" dirty="0" smtClean="0"/>
+              <a:t>Sprints</a:t>
+            </a:r>
+          </a:p>
+          <a:p>
+            <a:pPr lvl="1"/>
+            <a:r>
+              <a:rPr lang="en-US" dirty="0"/>
+              <a:t>2 weeks </a:t>
+            </a:r>
+            <a:r>
+              <a:rPr lang="en-US" dirty="0" smtClean="0"/>
+              <a:t>long</a:t>
+            </a:r>
+          </a:p>
+          <a:p>
+            <a:r>
+              <a:rPr lang="en-US" dirty="0" smtClean="0"/>
+              <a:t>Meetings</a:t>
+            </a:r>
+          </a:p>
+          <a:p>
+            <a:pPr lvl="1"/>
+            <a:r>
+              <a:rPr lang="en-US" dirty="0" smtClean="0"/>
+              <a:t>Sprint Planning Meetings/Sprint Review (at beginning/end of each sprint)</a:t>
+            </a:r>
+          </a:p>
+          <a:p>
+            <a:pPr lvl="2"/>
+            <a:r>
+              <a:rPr lang="en-US" dirty="0" smtClean="0"/>
+              <a:t>Product Backlog</a:t>
+            </a:r>
+          </a:p>
+          <a:p>
+            <a:pPr lvl="2"/>
+            <a:r>
+              <a:rPr lang="en-US" dirty="0" err="1" smtClean="0"/>
+              <a:t>Burndown</a:t>
+            </a:r>
+            <a:r>
+              <a:rPr lang="en-US" dirty="0" smtClean="0"/>
+              <a:t> Chart</a:t>
+            </a:r>
+          </a:p>
+          <a:p>
+            <a:pPr lvl="1"/>
+            <a:r>
+              <a:rPr lang="en-US" dirty="0" smtClean="0"/>
+              <a:t>Daily Scrum Meetings </a:t>
+            </a:r>
+          </a:p>
+          <a:p>
+            <a:pPr lvl="2"/>
+            <a:r>
+              <a:rPr lang="en-US" dirty="0" smtClean="0"/>
+              <a:t>Code review</a:t>
+            </a:r>
+          </a:p>
+          <a:p>
+            <a:pPr lvl="2"/>
+            <a:r>
+              <a:rPr lang="en-US" dirty="0" smtClean="0"/>
+              <a:t>Architecture discussion</a:t>
+            </a:r>
+          </a:p>
+        </p:txBody>
+      </p:sp>
+    </p:spTree>
+    <p:extLst>
+      <p:ext uri="{BB962C8B-B14F-4D97-AF65-F5344CB8AC3E}">
+        <p14:creationId xmlns:p14="http://schemas.microsoft.com/office/powerpoint/2010/main" val="2278892808"/>
+      </p:ext>
+    </p:extLst>
+  </p:cSld>
+  <p:clrMapOvr>
+    <a:masterClrMapping/>
+  </p:clrMapOvr>
+  <p:timing>
+    <p:tnLst>
+      <p:par>
+        <p:cTn id="1" dur="indefinite" restart="never" nodeType="tmRoot"/>
+      </p:par>
+    </p:tnLst>
+  </p:timing>
+</p:sld>
+</file>
+
+<file path=ppt/slides/slide5.xml><?xml version="1.0" encoding="utf-8"?>
+<p:sld xmlns:a="http://schemas.openxmlformats.org/drawingml/2006/main" xmlns:r="http://schemas.openxmlformats.org/officeDocument/2006/relationships" xmlns:p="http://schemas.openxmlformats.org/presentationml/2006/main">
+  <p:cSld>
+    <p:spTree>
+      <p:nvGrpSpPr>
+        <p:cNvPr id="1" name=""/>
+        <p:cNvGrpSpPr/>
+        <p:nvPr/>
+      </p:nvGrpSpPr>
+      <p:grpSpPr>
+        <a:xfrm>
+          <a:off x="0" y="0"/>
+          <a:ext cx="0" cy="0"/>
+          <a:chOff x="0" y="0"/>
+          <a:chExt cx="0" cy="0"/>
+        </a:xfrm>
+      </p:grpSpPr>
+      <p:sp>
+        <p:nvSpPr>
+          <p:cNvPr id="2" name="Title 1"/>
+          <p:cNvSpPr>
+            <a:spLocks noGrp="1"/>
+          </p:cNvSpPr>
+          <p:nvPr>
+            <p:ph type="title"/>
+          </p:nvPr>
+        </p:nvSpPr>
+        <p:spPr/>
+        <p:txBody>
+          <a:bodyPr>
+            <a:normAutofit fontScale="90000"/>
+          </a:bodyPr>
+          <a:lstStyle/>
+          <a:p>
+            <a:r>
+              <a:rPr lang="en-US" dirty="0" smtClean="0"/>
+              <a:t>Sprint Backlog and </a:t>
+            </a:r>
+            <a:r>
+              <a:rPr lang="en-US" dirty="0" err="1" smtClean="0"/>
+              <a:t>Burndown</a:t>
+            </a:r>
+            <a:r>
+              <a:rPr lang="en-US" dirty="0" smtClean="0"/>
+              <a:t> Chart</a:t>
+            </a:r>
+            <a:endParaRPr lang="en-US" dirty="0"/>
+          </a:p>
+        </p:txBody>
+      </p:sp>
+      <p:pic>
+        <p:nvPicPr>
+          <p:cNvPr id="5" name="Picture 4"/>
+          <p:cNvPicPr>
+            <a:picLocks noChangeAspect="1"/>
+          </p:cNvPicPr>
+          <p:nvPr/>
+        </p:nvPicPr>
+        <p:blipFill>
+          <a:blip r:embed="rId2">
+            <a:extLst>
+              <a:ext uri="{28A0092B-C50C-407E-A947-70E740481C1C}">
+                <a14:useLocalDpi xmlns:a14="http://schemas.microsoft.com/office/drawing/2010/main" val="0"/>
+              </a:ext>
+            </a:extLst>
+          </a:blip>
+          <a:stretch>
+            <a:fillRect/>
+          </a:stretch>
+        </p:blipFill>
+        <p:spPr>
+          <a:xfrm>
+            <a:off x="1066800" y="1752600"/>
+            <a:ext cx="7020287" cy="3495970"/>
+          </a:xfrm>
+          <a:prstGeom prst="rect">
+            <a:avLst/>
+          </a:prstGeom>
+        </p:spPr>
+      </p:pic>
+    </p:spTree>
+    <p:extLst>
+      <p:ext uri="{BB962C8B-B14F-4D97-AF65-F5344CB8AC3E}">
+        <p14:creationId xmlns:p14="http://schemas.microsoft.com/office/powerpoint/2010/main" val="829165369"/>
+      </p:ext>
+    </p:extLst>
+  </p:cSld>
+  <p:clrMapOvr>
+    <a:masterClrMapping/>
+  </p:clrMapOvr>
+  <p:timing>
+    <p:tnLst>
+      <p:par>
+        <p:cTn id="1" dur="indefinite" restart="never" nodeType="tmRoot"/>
+      </p:par>
+    </p:tnLst>
+  </p:timing>
+</p:sld>
+</file>
+
+<file path=ppt/slides/slide6.xml><?xml version="1.0" encoding="utf-8"?>
+<p:sld xmlns:a="http://schemas.openxmlformats.org/drawingml/2006/main" xmlns:r="http://schemas.openxmlformats.org/officeDocument/2006/relationships" xmlns:p="http://schemas.openxmlformats.org/presentationml/2006/main">
+  <p:cSld>
+    <p:spTree>
+      <p:nvGrpSpPr>
+        <p:cNvPr id="1" name=""/>
+        <p:cNvGrpSpPr/>
+        <p:nvPr/>
+      </p:nvGrpSpPr>
+      <p:grpSpPr>
+        <a:xfrm>
+          <a:off x="0" y="0"/>
+          <a:ext cx="0" cy="0"/>
+          <a:chOff x="0" y="0"/>
+          <a:chExt cx="0" cy="0"/>
+        </a:xfrm>
+      </p:grpSpPr>
+      <p:sp>
+        <p:nvSpPr>
+          <p:cNvPr id="2" name="Title 1"/>
+          <p:cNvSpPr>
+            <a:spLocks noGrp="1"/>
+          </p:cNvSpPr>
+          <p:nvPr>
+            <p:ph type="title"/>
+          </p:nvPr>
+        </p:nvSpPr>
+        <p:spPr/>
+        <p:txBody>
+          <a:bodyPr>
+            <a:normAutofit fontScale="90000"/>
+          </a:bodyPr>
+          <a:lstStyle/>
+          <a:p>
+            <a:r>
+              <a:rPr lang="en-US" dirty="0" smtClean="0"/>
+              <a:t>Project Asset Library and </a:t>
+            </a:r>
+            <a:r>
+              <a:rPr lang="en-US" dirty="0"/>
+              <a:t>S</a:t>
+            </a:r>
+            <a:r>
+              <a:rPr lang="en-US" dirty="0" smtClean="0"/>
+              <a:t>ource Version Control</a:t>
+            </a:r>
+            <a:endParaRPr lang="en-US" dirty="0"/>
+          </a:p>
+        </p:txBody>
+      </p:sp>
+      <p:sp>
+        <p:nvSpPr>
+          <p:cNvPr id="3" name="Content Placeholder 2"/>
+          <p:cNvSpPr>
+            <a:spLocks noGrp="1"/>
+          </p:cNvSpPr>
+          <p:nvPr>
+            <p:ph idx="1"/>
+          </p:nvPr>
+        </p:nvSpPr>
+        <p:spPr/>
+        <p:txBody>
+          <a:bodyPr/>
+          <a:lstStyle/>
+          <a:p>
+            <a:pPr marL="137160" indent="0">
+              <a:buNone/>
+            </a:pPr>
+            <a:r>
+              <a:rPr lang="en-US" sz="2000" dirty="0" smtClean="0"/>
+              <a:t>      </a:t>
+            </a:r>
+            <a:r>
+              <a:rPr lang="en-US" sz="2000" dirty="0" smtClean="0">
+                <a:solidFill>
+                  <a:schemeClr val="accent3">
+                    <a:lumMod val="60000"/>
+                    <a:lumOff val="40000"/>
+                  </a:schemeClr>
+                </a:solidFill>
+              </a:rPr>
+              <a:t>https</a:t>
+            </a:r>
+            <a:r>
+              <a:rPr lang="en-US" sz="2000" dirty="0">
+                <a:solidFill>
+                  <a:schemeClr val="accent3">
+                    <a:lumMod val="60000"/>
+                    <a:lumOff val="40000"/>
+                  </a:schemeClr>
+                </a:solidFill>
+              </a:rPr>
+              <a:t>://github.com/MattNewbill/android_advising_system</a:t>
+            </a:r>
+            <a:endParaRPr lang="en-US" sz="2000" dirty="0" smtClean="0">
+              <a:solidFill>
+                <a:schemeClr val="accent3">
+                  <a:lumMod val="60000"/>
+                  <a:lumOff val="40000"/>
+                </a:schemeClr>
+              </a:solidFill>
+            </a:endParaRPr>
+          </a:p>
+          <a:p>
+            <a:endParaRPr lang="en-US" dirty="0"/>
+          </a:p>
+        </p:txBody>
+      </p:sp>
+      <p:pic>
+        <p:nvPicPr>
+          <p:cNvPr id="3075" name="Picture 3" descr="C:\Users\Matt\Desktop\Computer Science\Comp595\android_combat_game\Project Specs\repo_organization.png"/>
+          <p:cNvPicPr>
+            <a:picLocks noChangeAspect="1" noChangeArrowheads="1"/>
+          </p:cNvPicPr>
+          <p:nvPr/>
+        </p:nvPicPr>
+        <p:blipFill>
+          <a:blip r:embed="rId2">
+            <a:extLst>
+              <a:ext uri="{28A0092B-C50C-407E-A947-70E740481C1C}">
+                <a14:useLocalDpi xmlns:a14="http://schemas.microsoft.com/office/drawing/2010/main" val="0"/>
+              </a:ext>
+            </a:extLst>
+          </a:blip>
+          <a:srcRect/>
+          <a:stretch>
+            <a:fillRect/>
+          </a:stretch>
+        </p:blipFill>
+        <p:spPr bwMode="auto">
+          <a:xfrm>
+            <a:off x="457200" y="2209800"/>
+            <a:ext cx="3500155" cy="2834219"/>
+          </a:xfrm>
+          <a:prstGeom prst="rect">
+            <a:avLst/>
+          </a:prstGeom>
+          <a:noFill/>
+          <a:extLst>
+            <a:ext uri="{909E8E84-426E-40DD-AFC4-6F175D3DCCD1}">
+              <a14:hiddenFill xmlns:a14="http://schemas.microsoft.com/office/drawing/2010/main">
+                <a:solidFill>
+                  <a:srgbClr val="FFFFFF"/>
+                </a:solidFill>
+              </a14:hiddenFill>
+            </a:ext>
+          </a:extLst>
+        </p:spPr>
+      </p:pic>
+      <p:pic>
+        <p:nvPicPr>
+          <p:cNvPr id="3076" name="Picture 4" descr="C:\Users\Matt\Desktop\Computer Science\Comp595\android_combat_game\Project Specs\repo_tool.png"/>
+          <p:cNvPicPr>
+            <a:picLocks noChangeAspect="1" noChangeArrowheads="1"/>
+          </p:cNvPicPr>
+          <p:nvPr/>
+        </p:nvPicPr>
+        <p:blipFill>
+          <a:blip r:embed="rId3">
+            <a:extLst>
+              <a:ext uri="{28A0092B-C50C-407E-A947-70E740481C1C}">
+                <a14:useLocalDpi xmlns:a14="http://schemas.microsoft.com/office/drawing/2010/main" val="0"/>
+              </a:ext>
+            </a:extLst>
+          </a:blip>
+          <a:srcRect/>
+          <a:stretch>
+            <a:fillRect/>
+          </a:stretch>
+        </p:blipFill>
+        <p:spPr bwMode="auto">
+          <a:xfrm>
+            <a:off x="4343400" y="2194206"/>
+            <a:ext cx="4334196" cy="2849813"/>
+          </a:xfrm>
+          <a:prstGeom prst="rect">
+            <a:avLst/>
+          </a:prstGeom>
+          <a:noFill/>
+          <a:extLst>
+            <a:ext uri="{909E8E84-426E-40DD-AFC4-6F175D3DCCD1}">
+              <a14:hiddenFill xmlns:a14="http://schemas.microsoft.com/office/drawing/2010/main">
+                <a:solidFill>
+                  <a:srgbClr val="FFFFFF"/>
+                </a:solidFill>
+              </a14:hiddenFill>
+            </a:ext>
+          </a:extLst>
+        </p:spPr>
+      </p:pic>
+    </p:spTree>
+    <p:extLst>
+      <p:ext uri="{BB962C8B-B14F-4D97-AF65-F5344CB8AC3E}">
+        <p14:creationId xmlns:p14="http://schemas.microsoft.com/office/powerpoint/2010/main" val="1935748172"/>
+      </p:ext>
+    </p:extLst>
+  </p:cSld>
+  <p:clrMapOvr>
+    <a:masterClrMapping/>
+  </p:clrMapOvr>
+  <p:timing>
+    <p:tnLst>
+      <p:par>
+        <p:cTn id="1" dur="indefinite" restart="never" nodeType="tmRoot"/>
+      </p:par>
+    </p:tnLst>
+  </p:timing>
+</p:sld>
+</file>
+
+<file path=ppt/slides/slide7.xml><?xml version="1.0" encoding="utf-8"?>
+<p:sld xmlns:a="http://schemas.openxmlformats.org/drawingml/2006/main" xmlns:r="http://schemas.openxmlformats.org/officeDocument/2006/relationships" xmlns:p="http://schemas.openxmlformats.org/presentationml/2006/main">
+  <p:cSld>
+    <p:spTree>
+      <p:nvGrpSpPr>
+        <p:cNvPr id="1" name=""/>
+        <p:cNvGrpSpPr/>
+        <p:nvPr/>
+      </p:nvGrpSpPr>
+      <p:grpSpPr>
+        <a:xfrm>
+          <a:off x="0" y="0"/>
+          <a:ext cx="0" cy="0"/>
+          <a:chOff x="0" y="0"/>
+          <a:chExt cx="0" cy="0"/>
+        </a:xfrm>
+      </p:grpSpPr>
+      <p:sp>
+        <p:nvSpPr>
+          <p:cNvPr id="2" name="Title 1"/>
+          <p:cNvSpPr>
+            <a:spLocks noGrp="1"/>
+          </p:cNvSpPr>
+          <p:nvPr>
+            <p:ph type="title"/>
+          </p:nvPr>
+        </p:nvSpPr>
+        <p:spPr/>
+        <p:txBody>
+          <a:bodyPr/>
+          <a:lstStyle/>
+          <a:p>
+            <a:r>
+              <a:rPr lang="en-US" dirty="0" smtClean="0"/>
+              <a:t>Challenges and risks</a:t>
+            </a:r>
+            <a:endParaRPr lang="en-US" dirty="0"/>
+          </a:p>
+        </p:txBody>
+      </p:sp>
+      <p:sp>
+        <p:nvSpPr>
+          <p:cNvPr id="3" name="Content Placeholder 2"/>
+          <p:cNvSpPr>
+            <a:spLocks noGrp="1"/>
+          </p:cNvSpPr>
+          <p:nvPr>
+            <p:ph idx="1"/>
+          </p:nvPr>
+        </p:nvSpPr>
+        <p:spPr/>
+        <p:txBody>
+          <a:bodyPr/>
+          <a:lstStyle/>
+          <a:p>
+            <a:r>
+              <a:rPr lang="en-US" dirty="0" smtClean="0"/>
+              <a:t>Performance</a:t>
+            </a:r>
+          </a:p>
+          <a:p>
+            <a:pPr lvl="1"/>
+            <a:r>
+              <a:rPr lang="en-US" dirty="0" smtClean="0"/>
+              <a:t>Garbage Collector -&gt; Unresponsive UI</a:t>
+            </a:r>
+          </a:p>
+          <a:p>
+            <a:pPr lvl="1"/>
+            <a:r>
+              <a:rPr lang="en-US" dirty="0" smtClean="0"/>
+              <a:t>Animations -&gt; Memory Allocation Restraints</a:t>
+            </a:r>
+          </a:p>
+          <a:p>
+            <a:r>
+              <a:rPr lang="en-US" dirty="0" smtClean="0"/>
+              <a:t>Commercial</a:t>
+            </a:r>
+          </a:p>
+          <a:p>
+            <a:pPr lvl="1"/>
+            <a:r>
+              <a:rPr lang="en-US" dirty="0" smtClean="0"/>
+              <a:t>Requires user base to launch</a:t>
+            </a:r>
+          </a:p>
+          <a:p>
+            <a:pPr lvl="1"/>
+            <a:r>
+              <a:rPr lang="en-US" dirty="0" smtClean="0"/>
+              <a:t>Competitive market with other games</a:t>
+            </a:r>
+          </a:p>
+          <a:p>
+            <a:r>
+              <a:rPr lang="en-US" dirty="0" smtClean="0"/>
+              <a:t>Challenges</a:t>
+            </a:r>
+          </a:p>
+          <a:p>
+            <a:pPr lvl="1"/>
+            <a:r>
+              <a:rPr lang="en-US" dirty="0" smtClean="0"/>
+              <a:t>Project management tools -&gt; </a:t>
+            </a:r>
+            <a:r>
+              <a:rPr lang="en-US" dirty="0" err="1" smtClean="0"/>
+              <a:t>Jiro</a:t>
+            </a:r>
+            <a:endParaRPr lang="en-US" dirty="0" smtClean="0"/>
+          </a:p>
+          <a:p>
+            <a:pPr lvl="1"/>
+            <a:r>
+              <a:rPr lang="en-US" dirty="0" smtClean="0"/>
+              <a:t>IDE (Eclipse)</a:t>
+            </a:r>
+          </a:p>
+          <a:p>
+            <a:pPr lvl="1"/>
+            <a:r>
+              <a:rPr lang="en-US" dirty="0" smtClean="0"/>
+              <a:t>Accommodating different screen sizes</a:t>
+            </a:r>
+          </a:p>
+          <a:p>
+            <a:pPr lvl="1"/>
+            <a:endParaRPr lang="en-US" dirty="0" smtClean="0"/>
+          </a:p>
+          <a:p>
+            <a:pPr lvl="1"/>
+            <a:endParaRPr lang="en-US" dirty="0"/>
+          </a:p>
+        </p:txBody>
+      </p:sp>
+    </p:spTree>
+    <p:extLst>
+      <p:ext uri="{BB962C8B-B14F-4D97-AF65-F5344CB8AC3E}">
+        <p14:creationId xmlns:p14="http://schemas.microsoft.com/office/powerpoint/2010/main" val="648631741"/>
+      </p:ext>
+    </p:extLst>
+  </p:cSld>
+  <p:clrMapOvr>
+    <a:masterClrMapping/>
+  </p:clrMapOvr>
+  <p:timing>
+    <p:tnLst>
+      <p:par>
+        <p:cTn id="1" dur="indefinite" restart="never" nodeType="tmRoot"/>
+      </p:par>
+    </p:tnLst>
+  </p:timing>
+</p:sld>
+</file>
+
+<file path=ppt/slides/slide8.xml><?xml version="1.0" encoding="utf-8"?>
+<p:sld xmlns:a="http://schemas.openxmlformats.org/drawingml/2006/main" xmlns:r="http://schemas.openxmlformats.org/officeDocument/2006/relationships" xmlns:p="http://schemas.openxmlformats.org/presentationml/2006/main">
+  <p:cSld>
+    <p:spTree>
+      <p:nvGrpSpPr>
+        <p:cNvPr id="1" name=""/>
+        <p:cNvGrpSpPr/>
+        <p:nvPr/>
+      </p:nvGrpSpPr>
+      <p:grpSpPr>
+        <a:xfrm>
+          <a:off x="0" y="0"/>
+          <a:ext cx="0" cy="0"/>
+          <a:chOff x="0" y="0"/>
+          <a:chExt cx="0" cy="0"/>
+        </a:xfrm>
+      </p:grpSpPr>
+      <p:sp>
+        <p:nvSpPr>
+          <p:cNvPr id="2" name="Title 1"/>
+          <p:cNvSpPr>
+            <a:spLocks noGrp="1"/>
+          </p:cNvSpPr>
+          <p:nvPr>
+            <p:ph type="title"/>
+          </p:nvPr>
+        </p:nvSpPr>
+        <p:spPr/>
+        <p:txBody>
+          <a:bodyPr/>
+          <a:lstStyle/>
+          <a:p>
+            <a:r>
+              <a:rPr lang="en-US" dirty="0" smtClean="0"/>
+              <a:t> Application Architecture</a:t>
+            </a:r>
+            <a:endParaRPr lang="en-US" dirty="0"/>
+          </a:p>
+        </p:txBody>
+      </p:sp>
+      <p:pic>
+        <p:nvPicPr>
+          <p:cNvPr id="4" name="Content Placeholder 3"/>
+          <p:cNvPicPr>
+            <a:picLocks noGrp="1" noChangeAspect="1"/>
+          </p:cNvPicPr>
+          <p:nvPr>
+            <p:ph idx="1"/>
+          </p:nvPr>
+        </p:nvPicPr>
+        <p:blipFill>
+          <a:blip r:embed="rId2">
+            <a:extLst>
+              <a:ext uri="{28A0092B-C50C-407E-A947-70E740481C1C}">
+                <a14:useLocalDpi xmlns:a14="http://schemas.microsoft.com/office/drawing/2010/main" val="0"/>
+              </a:ext>
+            </a:extLst>
+          </a:blip>
+          <a:stretch>
+            <a:fillRect/>
+          </a:stretch>
+        </p:blipFill>
+        <p:spPr>
+          <a:xfrm>
+            <a:off x="1219200" y="1524000"/>
+            <a:ext cx="3093988" cy="4351397"/>
+          </a:xfrm>
+        </p:spPr>
+      </p:pic>
+      <p:pic>
+        <p:nvPicPr>
+          <p:cNvPr id="5" name="Picture 4"/>
+          <p:cNvPicPr>
+            <a:picLocks noChangeAspect="1"/>
+          </p:cNvPicPr>
+          <p:nvPr/>
+        </p:nvPicPr>
+        <p:blipFill>
+          <a:blip r:embed="rId3">
+            <a:extLst>
+              <a:ext uri="{28A0092B-C50C-407E-A947-70E740481C1C}">
+                <a14:useLocalDpi xmlns:a14="http://schemas.microsoft.com/office/drawing/2010/main" val="0"/>
+              </a:ext>
+            </a:extLst>
+          </a:blip>
+          <a:stretch>
+            <a:fillRect/>
+          </a:stretch>
+        </p:blipFill>
+        <p:spPr>
+          <a:xfrm>
+            <a:off x="6172200" y="1524000"/>
+            <a:ext cx="1836579" cy="4389501"/>
+          </a:xfrm>
+          <a:prstGeom prst="rect">
+            <a:avLst/>
+          </a:prstGeom>
+        </p:spPr>
+      </p:pic>
+    </p:spTree>
+    <p:extLst>
+      <p:ext uri="{BB962C8B-B14F-4D97-AF65-F5344CB8AC3E}">
+        <p14:creationId xmlns:p14="http://schemas.microsoft.com/office/powerpoint/2010/main" val="958936446"/>
+      </p:ext>
+    </p:extLst>
+  </p:cSld>
+  <p:clrMapOvr>
+    <a:masterClrMapping/>
+  </p:clrMapOvr>
+  <p:timing>
+    <p:tnLst>
+      <p:par>
+        <p:cTn id="1" dur="indefinite" restart="never" nodeType="tmRoot"/>
+      </p:par>
+    </p:tnLst>
+  </p:timing>
+</p:sld>
+</file>
+
+<file path=ppt/slides/slide9.xml><?xml version="1.0" encoding="utf-8"?>
+<p:sld xmlns:a="http://schemas.openxmlformats.org/drawingml/2006/main" xmlns:r="http://schemas.openxmlformats.org/officeDocument/2006/relationships" xmlns:p="http://schemas.openxmlformats.org/presentationml/2006/main">
+  <p:cSld>
+    <p:spTree>
+      <p:nvGrpSpPr>
+        <p:cNvPr id="1" name=""/>
+        <p:cNvGrpSpPr/>
+        <p:nvPr/>
+      </p:nvGrpSpPr>
+      <p:grpSpPr>
+        <a:xfrm>
+          <a:off x="0" y="0"/>
+          <a:ext cx="0" cy="0"/>
+          <a:chOff x="0" y="0"/>
+          <a:chExt cx="0" cy="0"/>
+        </a:xfrm>
+      </p:grpSpPr>
+      <p:sp>
+        <p:nvSpPr>
+          <p:cNvPr id="2" name="Title 1"/>
+          <p:cNvSpPr>
+            <a:spLocks noGrp="1"/>
+          </p:cNvSpPr>
+          <p:nvPr>
+            <p:ph type="title"/>
+          </p:nvPr>
+        </p:nvSpPr>
+        <p:spPr/>
+        <p:txBody>
+          <a:bodyPr/>
+          <a:lstStyle/>
+          <a:p>
+            <a:endParaRPr lang="en-US"/>
+          </a:p>
+        </p:txBody>
+      </p:sp>
+      <p:sp>
+        <p:nvSpPr>
+          <p:cNvPr id="3" name="Content Placeholder 2"/>
+          <p:cNvSpPr>
+            <a:spLocks noGrp="1"/>
+          </p:cNvSpPr>
+          <p:nvPr>
+            <p:ph idx="1"/>
+          </p:nvPr>
+        </p:nvSpPr>
+        <p:spPr/>
+        <p:txBody>
+          <a:bodyPr/>
+          <a:lstStyle/>
+          <a:p>
+            <a:endParaRPr lang="en-US"/>
+          </a:p>
+        </p:txBody>
+      </p:sp>
+    </p:spTree>
+    <p:extLst>
+      <p:ext uri="{BB962C8B-B14F-4D97-AF65-F5344CB8AC3E}">
+        <p14:creationId xmlns:p14="http://schemas.microsoft.com/office/powerpoint/2010/main" val="510944082"/>
+      </p:ext>
+    </p:extLst>
+  </p:cSld>
+  <p:clrMapOvr>
+    <a:masterClrMapping/>
+  </p:clrMapOvr>
+  <p:timing>
+    <p:tnLst>
+      <p:par>
+        <p:cTn id="1" dur="indefinite" restart="never" nodeType="tmRoot"/>
+      </p:par>
+    </p:tnLst>
+  </p:timing>
 </p:sld>
 </file>
 

</xml_diff>